<commit_message>
added more pictures and backgrounds
</commit_message>
<xml_diff>
--- a/Icons.pptx
+++ b/Icons.pptx
@@ -5,7 +5,7 @@
     <p:sldMasterId id="2147483648" r:id="rId1"/>
   </p:sldMasterIdLst>
   <p:notesMasterIdLst>
-    <p:notesMasterId r:id="rId7"/>
+    <p:notesMasterId r:id="rId9"/>
   </p:notesMasterIdLst>
   <p:sldIdLst>
     <p:sldId id="256" r:id="rId2"/>
@@ -13,6 +13,8 @@
     <p:sldId id="259" r:id="rId4"/>
     <p:sldId id="257" r:id="rId5"/>
     <p:sldId id="260" r:id="rId6"/>
+    <p:sldId id="261" r:id="rId7"/>
+    <p:sldId id="262" r:id="rId8"/>
   </p:sldIdLst>
   <p:sldSz cx="12192000" cy="6858000"/>
   <p:notesSz cx="6858000" cy="9144000"/>
@@ -201,7 +203,7 @@
           <a:p>
             <a:fld id="{9BBBB5CC-87DC-A444-968E-1205D972A66A}" type="datetimeFigureOut">
               <a:rPr lang="en-US" smtClean="0"/>
-              <a:t>7/25/19</a:t>
+              <a:t>7/26/19</a:t>
             </a:fld>
             <a:endParaRPr lang="en-US"/>
           </a:p>
@@ -600,7 +602,7 @@
           <a:p>
             <a:fld id="{9162FEA8-8D8A-494E-86B5-C88261A123EC}" type="datetimeFigureOut">
               <a:rPr lang="en-US" smtClean="0"/>
-              <a:t>7/25/19</a:t>
+              <a:t>7/26/19</a:t>
             </a:fld>
             <a:endParaRPr lang="en-US"/>
           </a:p>
@@ -770,7 +772,7 @@
           <a:p>
             <a:fld id="{9162FEA8-8D8A-494E-86B5-C88261A123EC}" type="datetimeFigureOut">
               <a:rPr lang="en-US" smtClean="0"/>
-              <a:t>7/25/19</a:t>
+              <a:t>7/26/19</a:t>
             </a:fld>
             <a:endParaRPr lang="en-US"/>
           </a:p>
@@ -950,7 +952,7 @@
           <a:p>
             <a:fld id="{9162FEA8-8D8A-494E-86B5-C88261A123EC}" type="datetimeFigureOut">
               <a:rPr lang="en-US" smtClean="0"/>
-              <a:t>7/25/19</a:t>
+              <a:t>7/26/19</a:t>
             </a:fld>
             <a:endParaRPr lang="en-US"/>
           </a:p>
@@ -1120,7 +1122,7 @@
           <a:p>
             <a:fld id="{9162FEA8-8D8A-494E-86B5-C88261A123EC}" type="datetimeFigureOut">
               <a:rPr lang="en-US" smtClean="0"/>
-              <a:t>7/25/19</a:t>
+              <a:t>7/26/19</a:t>
             </a:fld>
             <a:endParaRPr lang="en-US"/>
           </a:p>
@@ -1366,7 +1368,7 @@
           <a:p>
             <a:fld id="{9162FEA8-8D8A-494E-86B5-C88261A123EC}" type="datetimeFigureOut">
               <a:rPr lang="en-US" smtClean="0"/>
-              <a:t>7/25/19</a:t>
+              <a:t>7/26/19</a:t>
             </a:fld>
             <a:endParaRPr lang="en-US"/>
           </a:p>
@@ -1598,7 +1600,7 @@
           <a:p>
             <a:fld id="{9162FEA8-8D8A-494E-86B5-C88261A123EC}" type="datetimeFigureOut">
               <a:rPr lang="en-US" smtClean="0"/>
-              <a:t>7/25/19</a:t>
+              <a:t>7/26/19</a:t>
             </a:fld>
             <a:endParaRPr lang="en-US"/>
           </a:p>
@@ -1965,7 +1967,7 @@
           <a:p>
             <a:fld id="{9162FEA8-8D8A-494E-86B5-C88261A123EC}" type="datetimeFigureOut">
               <a:rPr lang="en-US" smtClean="0"/>
-              <a:t>7/25/19</a:t>
+              <a:t>7/26/19</a:t>
             </a:fld>
             <a:endParaRPr lang="en-US"/>
           </a:p>
@@ -2083,7 +2085,7 @@
           <a:p>
             <a:fld id="{9162FEA8-8D8A-494E-86B5-C88261A123EC}" type="datetimeFigureOut">
               <a:rPr lang="en-US" smtClean="0"/>
-              <a:t>7/25/19</a:t>
+              <a:t>7/26/19</a:t>
             </a:fld>
             <a:endParaRPr lang="en-US"/>
           </a:p>
@@ -2178,7 +2180,7 @@
           <a:p>
             <a:fld id="{9162FEA8-8D8A-494E-86B5-C88261A123EC}" type="datetimeFigureOut">
               <a:rPr lang="en-US" smtClean="0"/>
-              <a:t>7/25/19</a:t>
+              <a:t>7/26/19</a:t>
             </a:fld>
             <a:endParaRPr lang="en-US"/>
           </a:p>
@@ -2455,7 +2457,7 @@
           <a:p>
             <a:fld id="{9162FEA8-8D8A-494E-86B5-C88261A123EC}" type="datetimeFigureOut">
               <a:rPr lang="en-US" smtClean="0"/>
-              <a:t>7/25/19</a:t>
+              <a:t>7/26/19</a:t>
             </a:fld>
             <a:endParaRPr lang="en-US"/>
           </a:p>
@@ -2708,7 +2710,7 @@
           <a:p>
             <a:fld id="{9162FEA8-8D8A-494E-86B5-C88261A123EC}" type="datetimeFigureOut">
               <a:rPr lang="en-US" smtClean="0"/>
-              <a:t>7/25/19</a:t>
+              <a:t>7/26/19</a:t>
             </a:fld>
             <a:endParaRPr lang="en-US"/>
           </a:p>
@@ -2921,7 +2923,7 @@
           <a:p>
             <a:fld id="{9162FEA8-8D8A-494E-86B5-C88261A123EC}" type="datetimeFigureOut">
               <a:rPr lang="en-US" smtClean="0"/>
-              <a:t>7/25/19</a:t>
+              <a:t>7/26/19</a:t>
             </a:fld>
             <a:endParaRPr lang="en-US"/>
           </a:p>
@@ -4780,6 +4782,200 @@
     <p:extLst>
       <p:ext uri="{BB962C8B-B14F-4D97-AF65-F5344CB8AC3E}">
         <p14:creationId xmlns:p14="http://schemas.microsoft.com/office/powerpoint/2010/main" val="1565304703"/>
+      </p:ext>
+    </p:extLst>
+  </p:cSld>
+  <p:clrMapOvr>
+    <a:masterClrMapping/>
+  </p:clrMapOvr>
+</p:sld>
+</file>
+
+<file path=ppt/slides/slide6.xml><?xml version="1.0" encoding="utf-8"?>
+<p:sld xmlns:a="http://schemas.openxmlformats.org/drawingml/2006/main" xmlns:r="http://schemas.openxmlformats.org/officeDocument/2006/relationships" xmlns:p="http://schemas.openxmlformats.org/presentationml/2006/main">
+  <p:cSld>
+    <p:spTree>
+      <p:nvGrpSpPr>
+        <p:cNvPr id="1" name=""/>
+        <p:cNvGrpSpPr/>
+        <p:nvPr/>
+      </p:nvGrpSpPr>
+      <p:grpSpPr>
+        <a:xfrm>
+          <a:off x="0" y="0"/>
+          <a:ext cx="0" cy="0"/>
+          <a:chOff x="0" y="0"/>
+          <a:chExt cx="0" cy="0"/>
+        </a:xfrm>
+      </p:grpSpPr>
+      <p:pic>
+        <p:nvPicPr>
+          <p:cNvPr id="4" name="Picture 3"/>
+          <p:cNvPicPr>
+            <a:picLocks noChangeAspect="1"/>
+          </p:cNvPicPr>
+          <p:nvPr/>
+        </p:nvPicPr>
+        <p:blipFill rotWithShape="1">
+          <a:blip r:embed="rId2"/>
+          <a:srcRect b="11923"/>
+          <a:stretch/>
+        </p:blipFill>
+        <p:spPr>
+          <a:xfrm>
+            <a:off x="1617784" y="586156"/>
+            <a:ext cx="8128000" cy="2684582"/>
+          </a:xfrm>
+          <a:prstGeom prst="rect">
+            <a:avLst/>
+          </a:prstGeom>
+        </p:spPr>
+      </p:pic>
+      <p:pic>
+        <p:nvPicPr>
+          <p:cNvPr id="6" name="Picture 5"/>
+          <p:cNvPicPr>
+            <a:picLocks noChangeAspect="1"/>
+          </p:cNvPicPr>
+          <p:nvPr/>
+        </p:nvPicPr>
+        <p:blipFill rotWithShape="1">
+          <a:blip r:embed="rId2"/>
+          <a:srcRect t="11539"/>
+          <a:stretch/>
+        </p:blipFill>
+        <p:spPr>
+          <a:xfrm>
+            <a:off x="1348152" y="3622430"/>
+            <a:ext cx="8128000" cy="2696307"/>
+          </a:xfrm>
+          <a:prstGeom prst="rect">
+            <a:avLst/>
+          </a:prstGeom>
+        </p:spPr>
+      </p:pic>
+      <p:sp>
+        <p:nvSpPr>
+          <p:cNvPr id="7" name="TextBox 6"/>
+          <p:cNvSpPr txBox="1"/>
+          <p:nvPr/>
+        </p:nvSpPr>
+        <p:spPr>
+          <a:xfrm>
+            <a:off x="10427677" y="1097450"/>
+            <a:ext cx="1131913" cy="830997"/>
+          </a:xfrm>
+          <a:prstGeom prst="rect">
+            <a:avLst/>
+          </a:prstGeom>
+          <a:noFill/>
+        </p:spPr>
+        <p:txBody>
+          <a:bodyPr wrap="none" rtlCol="0">
+            <a:spAutoFit/>
+          </a:bodyPr>
+          <a:lstStyle/>
+          <a:p>
+            <a:r>
+              <a:rPr lang="en-US" sz="4800" dirty="0" smtClean="0"/>
+              <a:t>test</a:t>
+            </a:r>
+            <a:endParaRPr lang="en-US" sz="4800" dirty="0"/>
+          </a:p>
+        </p:txBody>
+      </p:sp>
+    </p:spTree>
+    <p:extLst>
+      <p:ext uri="{BB962C8B-B14F-4D97-AF65-F5344CB8AC3E}">
+        <p14:creationId xmlns:p14="http://schemas.microsoft.com/office/powerpoint/2010/main" val="1091008279"/>
+      </p:ext>
+    </p:extLst>
+  </p:cSld>
+  <p:clrMapOvr>
+    <a:masterClrMapping/>
+  </p:clrMapOvr>
+</p:sld>
+</file>
+
+<file path=ppt/slides/slide7.xml><?xml version="1.0" encoding="utf-8"?>
+<p:sld xmlns:a="http://schemas.openxmlformats.org/drawingml/2006/main" xmlns:r="http://schemas.openxmlformats.org/officeDocument/2006/relationships" xmlns:p="http://schemas.openxmlformats.org/presentationml/2006/main">
+  <p:cSld>
+    <p:spTree>
+      <p:nvGrpSpPr>
+        <p:cNvPr id="1" name=""/>
+        <p:cNvGrpSpPr/>
+        <p:nvPr/>
+      </p:nvGrpSpPr>
+      <p:grpSpPr>
+        <a:xfrm>
+          <a:off x="0" y="0"/>
+          <a:ext cx="0" cy="0"/>
+          <a:chOff x="0" y="0"/>
+          <a:chExt cx="0" cy="0"/>
+        </a:xfrm>
+      </p:grpSpPr>
+      <p:pic>
+        <p:nvPicPr>
+          <p:cNvPr id="5" name="Picture 4"/>
+          <p:cNvPicPr>
+            <a:picLocks noChangeAspect="1"/>
+          </p:cNvPicPr>
+          <p:nvPr/>
+        </p:nvPicPr>
+        <p:blipFill rotWithShape="1">
+          <a:blip r:embed="rId2">
+            <a:extLst>
+              <a:ext uri="{28A0092B-C50C-407E-A947-70E740481C1C}">
+                <a14:useLocalDpi xmlns:a14="http://schemas.microsoft.com/office/drawing/2010/main" val="0"/>
+              </a:ext>
+            </a:extLst>
+          </a:blip>
+          <a:srcRect t="26596"/>
+          <a:stretch/>
+        </p:blipFill>
+        <p:spPr>
+          <a:xfrm>
+            <a:off x="1193799" y="1195753"/>
+            <a:ext cx="3717287" cy="4853353"/>
+          </a:xfrm>
+          <a:prstGeom prst="rect">
+            <a:avLst/>
+          </a:prstGeom>
+        </p:spPr>
+      </p:pic>
+      <p:pic>
+        <p:nvPicPr>
+          <p:cNvPr id="6" name="Picture 5"/>
+          <p:cNvPicPr>
+            <a:picLocks noChangeAspect="1"/>
+          </p:cNvPicPr>
+          <p:nvPr/>
+        </p:nvPicPr>
+        <p:blipFill rotWithShape="1">
+          <a:blip r:embed="rId3">
+            <a:extLst>
+              <a:ext uri="{28A0092B-C50C-407E-A947-70E740481C1C}">
+                <a14:useLocalDpi xmlns:a14="http://schemas.microsoft.com/office/drawing/2010/main" val="0"/>
+              </a:ext>
+            </a:extLst>
+          </a:blip>
+          <a:srcRect t="14145"/>
+          <a:stretch/>
+        </p:blipFill>
+        <p:spPr>
+          <a:xfrm>
+            <a:off x="6630377" y="756137"/>
+            <a:ext cx="4623777" cy="5292969"/>
+          </a:xfrm>
+          <a:prstGeom prst="rect">
+            <a:avLst/>
+          </a:prstGeom>
+        </p:spPr>
+      </p:pic>
+    </p:spTree>
+    <p:extLst>
+      <p:ext uri="{BB962C8B-B14F-4D97-AF65-F5344CB8AC3E}">
+        <p14:creationId xmlns:p14="http://schemas.microsoft.com/office/powerpoint/2010/main" val="1003304225"/>
       </p:ext>
     </p:extLst>
   </p:cSld>

</xml_diff>